<commit_message>
Jim's fixes to Module 10 slides
</commit_message>
<xml_diff>
--- a/Slides/Lesson 10.4 Converting from Immutable to Mutable Objects.pptx
+++ b/Slides/Lesson 10.4 Converting from Immutable to Mutable Objects.pptx
@@ -225,7 +225,7 @@
           <a:p>
             <a:fld id="{B7676462-FC52-45C7-85E1-16BDE2BE239E}" type="datetimeFigureOut">
               <a:rPr lang="en-US" smtClean="0"/>
-              <a:t>11/10/2015</a:t>
+              <a:t>11/15/2015</a:t>
             </a:fld>
             <a:endParaRPr lang="en-US"/>
           </a:p>
@@ -1094,7 +1094,7 @@
           <a:p>
             <a:fld id="{2F1F79F5-7BEC-496A-AFC7-876E38F64D71}" type="datetime1">
               <a:rPr lang="en-US" smtClean="0"/>
-              <a:t>11/10/2015</a:t>
+              <a:t>11/15/2015</a:t>
             </a:fld>
             <a:endParaRPr lang="en-US"/>
           </a:p>
@@ -1219,7 +1219,7 @@
           <a:p>
             <a:fld id="{2F7B77F5-1464-4F6B-92A8-64FC8A508293}" type="datetime1">
               <a:rPr lang="en-US" smtClean="0"/>
-              <a:t>11/10/2015</a:t>
+              <a:t>11/15/2015</a:t>
             </a:fld>
             <a:endParaRPr lang="en-US"/>
           </a:p>
@@ -1321,7 +1321,7 @@
           <a:p>
             <a:fld id="{0A05703A-7669-4FEA-9056-25299B4D29D4}" type="datetime1">
               <a:rPr lang="en-US" smtClean="0"/>
-              <a:t>11/10/2015</a:t>
+              <a:t>11/15/2015</a:t>
             </a:fld>
             <a:endParaRPr lang="en-US"/>
           </a:p>
@@ -1598,7 +1598,7 @@
           <a:p>
             <a:fld id="{6E5077B5-BB57-49DB-88CA-226A139E5C01}" type="datetime1">
               <a:rPr lang="en-US" smtClean="0"/>
-              <a:t>11/10/2015</a:t>
+              <a:t>11/15/2015</a:t>
             </a:fld>
             <a:endParaRPr lang="en-US"/>
           </a:p>
@@ -1851,7 +1851,7 @@
           <a:p>
             <a:fld id="{C48D9447-CBD6-49A1-89FD-8512A8CF8999}" type="datetime1">
               <a:rPr lang="en-US" smtClean="0"/>
-              <a:t>11/10/2015</a:t>
+              <a:t>11/15/2015</a:t>
             </a:fld>
             <a:endParaRPr lang="en-US"/>
           </a:p>
@@ -2021,7 +2021,7 @@
           <a:p>
             <a:fld id="{A3639A2A-823D-48B7-9ACE-7FAF42870BA9}" type="datetime1">
               <a:rPr lang="en-US" smtClean="0"/>
-              <a:t>11/10/2015</a:t>
+              <a:t>11/15/2015</a:t>
             </a:fld>
             <a:endParaRPr lang="en-US"/>
           </a:p>
@@ -2201,7 +2201,7 @@
           <a:p>
             <a:fld id="{ED1B6996-82E9-463C-972C-7B56056E426C}" type="datetime1">
               <a:rPr lang="en-US" smtClean="0"/>
-              <a:t>11/10/2015</a:t>
+              <a:t>11/15/2015</a:t>
             </a:fld>
             <a:endParaRPr lang="en-US"/>
           </a:p>
@@ -2384,7 +2384,7 @@
           <a:p>
             <a:fld id="{E22ED4DA-448D-4BB1-B935-CC112220207B}" type="datetime1">
               <a:rPr lang="en-US" smtClean="0"/>
-              <a:t>11/10/2015</a:t>
+              <a:t>11/15/2015</a:t>
             </a:fld>
             <a:endParaRPr lang="en-US"/>
           </a:p>
@@ -2566,7 +2566,7 @@
           <a:p>
             <a:fld id="{E22ED4DA-448D-4BB1-B935-CC112220207B}" type="datetime1">
               <a:rPr lang="en-US" smtClean="0"/>
-              <a:t>11/10/2015</a:t>
+              <a:t>11/15/2015</a:t>
             </a:fld>
             <a:endParaRPr lang="en-US"/>
           </a:p>
@@ -2835,7 +2835,7 @@
           <a:p>
             <a:fld id="{FF5D65A6-AB94-4435-B0B7-3743215FA46C}" type="datetime1">
               <a:rPr lang="en-US" smtClean="0"/>
-              <a:t>11/10/2015</a:t>
+              <a:t>11/15/2015</a:t>
             </a:fld>
             <a:endParaRPr lang="en-US"/>
           </a:p>
@@ -3138,7 +3138,7 @@
           <a:p>
             <a:fld id="{5D1846AD-9252-4647-9435-4C2AC365653A}" type="datetime1">
               <a:rPr lang="en-US" smtClean="0"/>
-              <a:t>11/10/2015</a:t>
+              <a:t>11/15/2015</a:t>
             </a:fld>
             <a:endParaRPr lang="en-US"/>
           </a:p>
@@ -3316,7 +3316,7 @@
           <a:p>
             <a:fld id="{FF5D65A6-AB94-4435-B0B7-3743215FA46C}" type="datetime1">
               <a:rPr lang="en-US" smtClean="0"/>
-              <a:t>11/10/2015</a:t>
+              <a:t>11/15/2015</a:t>
             </a:fld>
             <a:endParaRPr lang="en-US"/>
           </a:p>
@@ -3618,7 +3618,7 @@
           <a:p>
             <a:fld id="{7C193DC4-6EF0-48C9-B29C-616106A645E1}" type="datetime1">
               <a:rPr lang="en-US" smtClean="0"/>
-              <a:t>11/10/2015</a:t>
+              <a:t>11/15/2015</a:t>
             </a:fld>
             <a:endParaRPr lang="en-US"/>
           </a:p>
@@ -3906,7 +3906,7 @@
           <a:p>
             <a:fld id="{5D1846AD-9252-4647-9435-4C2AC365653A}" type="datetime1">
               <a:rPr lang="en-US" smtClean="0"/>
-              <a:t>11/10/2015</a:t>
+              <a:t>11/15/2015</a:t>
             </a:fld>
             <a:endParaRPr lang="en-US"/>
           </a:p>
@@ -4328,7 +4328,7 @@
           <a:p>
             <a:fld id="{CE56DC10-3561-4063-A6AF-C1CC7A41040A}" type="datetime1">
               <a:rPr lang="en-US" smtClean="0"/>
-              <a:t>11/10/2015</a:t>
+              <a:t>11/15/2015</a:t>
             </a:fld>
             <a:endParaRPr lang="en-US"/>
           </a:p>
@@ -4553,7 +4553,7 @@
           <a:p>
             <a:fld id="{02B3F677-983B-48DB-ADFD-63FE6CBC7FB2}" type="datetime1">
               <a:rPr lang="en-US" smtClean="0"/>
-              <a:t>11/10/2015</a:t>
+              <a:t>11/15/2015</a:t>
             </a:fld>
             <a:endParaRPr lang="en-US"/>
           </a:p>
@@ -5753,6 +5753,149 @@
           </a:p>
         </p:txBody>
       </p:sp>
+      <p:sp>
+        <p:nvSpPr>
+          <p:cNvPr id="7" name="Rectangle 6"/>
+          <p:cNvSpPr/>
+          <p:nvPr/>
+        </p:nvSpPr>
+        <p:spPr>
+          <a:xfrm>
+            <a:off x="5565742" y="2438400"/>
+            <a:ext cx="2895600" cy="1066800"/>
+          </a:xfrm>
+          <a:prstGeom prst="rect">
+            <a:avLst/>
+          </a:prstGeom>
+          <a:solidFill>
+            <a:schemeClr val="accent3">
+              <a:lumMod val="40000"/>
+              <a:lumOff val="60000"/>
+            </a:schemeClr>
+          </a:solidFill>
+          <a:ln/>
+        </p:spPr>
+        <p:style>
+          <a:lnRef idx="2">
+            <a:schemeClr val="accent1"/>
+          </a:lnRef>
+          <a:fillRef idx="1">
+            <a:schemeClr val="lt1"/>
+          </a:fillRef>
+          <a:effectRef idx="0">
+            <a:schemeClr val="accent1"/>
+          </a:effectRef>
+          <a:fontRef idx="minor">
+            <a:schemeClr val="dk1"/>
+          </a:fontRef>
+        </p:style>
+        <p:txBody>
+          <a:bodyPr rot="0" spcFirstLastPara="0" vertOverflow="overflow" horzOverflow="overflow" vert="horz" wrap="square" lIns="91440" tIns="45720" rIns="91440" bIns="45720" numCol="1" spcCol="0" rtlCol="0" fromWordArt="0" anchor="ctr" anchorCtr="0" forceAA="0" compatLnSpc="1">
+            <a:prstTxWarp prst="textNoShape">
+              <a:avLst/>
+            </a:prstTxWarp>
+            <a:noAutofit/>
+          </a:bodyPr>
+          <a:lstStyle/>
+          <a:p>
+            <a:pPr algn="ctr"/>
+            <a:r>
+              <a:rPr lang="en-US" sz="1200" b="1" dirty="0" smtClean="0">
+                <a:solidFill>
+                  <a:schemeClr val="tx1"/>
+                </a:solidFill>
+              </a:rPr>
+              <a:t>for-each</a:t>
+            </a:r>
+            <a:r>
+              <a:rPr lang="en-US" sz="1200" dirty="0" smtClean="0">
+                <a:solidFill>
+                  <a:schemeClr val="tx1"/>
+                </a:solidFill>
+              </a:rPr>
+              <a:t> is like map, but it doesn't make a list from the results.  Its contract is</a:t>
+            </a:r>
+          </a:p>
+          <a:p>
+            <a:pPr algn="ctr"/>
+            <a:r>
+              <a:rPr lang="en-US" sz="1200" b="1" dirty="0" smtClean="0">
+                <a:solidFill>
+                  <a:schemeClr val="tx1"/>
+                </a:solidFill>
+              </a:rPr>
+              <a:t>(X -&gt; Void) </a:t>
+            </a:r>
+            <a:r>
+              <a:rPr lang="en-US" sz="1200" b="1" dirty="0" err="1" smtClean="0">
+                <a:solidFill>
+                  <a:schemeClr val="tx1"/>
+                </a:solidFill>
+              </a:rPr>
+              <a:t>ListOfX</a:t>
+            </a:r>
+            <a:r>
+              <a:rPr lang="en-US" sz="1200" b="1" dirty="0" smtClean="0">
+                <a:solidFill>
+                  <a:schemeClr val="tx1"/>
+                </a:solidFill>
+              </a:rPr>
+              <a:t>  -&gt; Void</a:t>
+            </a:r>
+          </a:p>
+          <a:p>
+            <a:pPr algn="ctr"/>
+            <a:r>
+              <a:rPr lang="en-US" sz="1200" dirty="0" smtClean="0">
+                <a:solidFill>
+                  <a:schemeClr val="tx1"/>
+                </a:solidFill>
+              </a:rPr>
+              <a:t>See the Racket documentation for more.</a:t>
+            </a:r>
+            <a:endParaRPr lang="en-US" sz="1200" dirty="0">
+              <a:solidFill>
+                <a:schemeClr val="tx1"/>
+              </a:solidFill>
+            </a:endParaRPr>
+          </a:p>
+        </p:txBody>
+      </p:sp>
+      <p:cxnSp>
+        <p:nvCxnSpPr>
+          <p:cNvPr id="9" name="Straight Arrow Connector 8"/>
+          <p:cNvCxnSpPr>
+            <a:stCxn id="7" idx="2"/>
+          </p:cNvCxnSpPr>
+          <p:nvPr/>
+        </p:nvCxnSpPr>
+        <p:spPr>
+          <a:xfrm flipH="1">
+            <a:off x="6400800" y="3505200"/>
+            <a:ext cx="612742" cy="457200"/>
+          </a:xfrm>
+          <a:prstGeom prst="straightConnector1">
+            <a:avLst/>
+          </a:prstGeom>
+          <a:ln>
+            <a:tailEnd type="triangle"/>
+          </a:ln>
+        </p:spPr>
+        <p:style>
+          <a:lnRef idx="1">
+            <a:schemeClr val="accent1"/>
+          </a:lnRef>
+          <a:fillRef idx="0">
+            <a:schemeClr val="accent1"/>
+          </a:fillRef>
+          <a:effectRef idx="0">
+            <a:schemeClr val="accent1"/>
+          </a:effectRef>
+          <a:fontRef idx="minor">
+            <a:schemeClr val="tx1"/>
+          </a:fontRef>
+        </p:style>
+      </p:cxnSp>
     </p:spTree>
     <p:extLst>
       <p:ext uri="{BB962C8B-B14F-4D97-AF65-F5344CB8AC3E}">
@@ -6934,12 +7077,24 @@
               <a:t>;; </a:t>
             </a:r>
             <a:r>
-              <a:rPr lang="en-US" sz="4800" dirty="0" err="1"/>
+              <a:rPr lang="en-US" sz="4800" dirty="0" err="1">
+                <a:solidFill>
+                  <a:srgbClr val="FF0000"/>
+                </a:solidFill>
+              </a:rPr>
               <a:t>SWidget</a:t>
             </a:r>
             <a:r>
+              <a:rPr lang="en-US" sz="4800" dirty="0">
+                <a:solidFill>
+                  <a:srgbClr val="FF0000"/>
+                </a:solidFill>
+              </a:rPr>
+              <a:t>&lt;%&gt; </a:t>
+            </a:r>
+            <a:r>
               <a:rPr lang="en-US" sz="4800" dirty="0"/>
-              <a:t>&lt;%&gt; interface.</a:t>
+              <a:t>interface.</a:t>
             </a:r>
           </a:p>
           <a:p>
@@ -7483,6 +7638,140 @@
               <a:t> still returns a scene</a:t>
             </a:r>
             <a:endParaRPr lang="en-US" sz="1600" dirty="0">
+              <a:solidFill>
+                <a:schemeClr val="tx1"/>
+              </a:solidFill>
+            </a:endParaRPr>
+          </a:p>
+        </p:txBody>
+      </p:sp>
+      <p:sp>
+        <p:nvSpPr>
+          <p:cNvPr id="2" name="Rectangle 1"/>
+          <p:cNvSpPr/>
+          <p:nvPr/>
+        </p:nvSpPr>
+        <p:spPr>
+          <a:xfrm>
+            <a:off x="5943600" y="2133600"/>
+            <a:ext cx="2971800" cy="1524000"/>
+          </a:xfrm>
+          <a:prstGeom prst="rect">
+            <a:avLst/>
+          </a:prstGeom>
+          <a:solidFill>
+            <a:schemeClr val="accent3">
+              <a:lumMod val="40000"/>
+              <a:lumOff val="60000"/>
+            </a:schemeClr>
+          </a:solidFill>
+          <a:ln/>
+        </p:spPr>
+        <p:style>
+          <a:lnRef idx="2">
+            <a:schemeClr val="accent1"/>
+          </a:lnRef>
+          <a:fillRef idx="1">
+            <a:schemeClr val="lt1"/>
+          </a:fillRef>
+          <a:effectRef idx="0">
+            <a:schemeClr val="accent1"/>
+          </a:effectRef>
+          <a:fontRef idx="minor">
+            <a:schemeClr val="dk1"/>
+          </a:fontRef>
+        </p:style>
+        <p:txBody>
+          <a:bodyPr rot="0" spcFirstLastPara="0" vertOverflow="overflow" horzOverflow="overflow" vert="horz" wrap="square" lIns="91440" tIns="45720" rIns="91440" bIns="45720" numCol="1" spcCol="0" rtlCol="0" fromWordArt="0" anchor="ctr" anchorCtr="0" forceAA="0" compatLnSpc="1">
+            <a:prstTxWarp prst="textNoShape">
+              <a:avLst/>
+            </a:prstTxWarp>
+            <a:noAutofit/>
+          </a:bodyPr>
+          <a:lstStyle/>
+          <a:p>
+            <a:pPr algn="ctr"/>
+            <a:r>
+              <a:rPr lang="en-US" dirty="0" smtClean="0">
+                <a:solidFill>
+                  <a:schemeClr val="tx1"/>
+                </a:solidFill>
+              </a:rPr>
+              <a:t>We adopt the convention that </a:t>
+            </a:r>
+            <a:r>
+              <a:rPr lang="en-US" dirty="0" err="1" smtClean="0">
+                <a:solidFill>
+                  <a:schemeClr val="tx1"/>
+                </a:solidFill>
+              </a:rPr>
+              <a:t>stateful</a:t>
+            </a:r>
+            <a:r>
+              <a:rPr lang="en-US" dirty="0" smtClean="0">
+                <a:solidFill>
+                  <a:schemeClr val="tx1"/>
+                </a:solidFill>
+              </a:rPr>
+              <a:t> things have names starting with "</a:t>
+            </a:r>
+            <a:r>
+              <a:rPr lang="en-US" b="1" dirty="0" smtClean="0">
+                <a:solidFill>
+                  <a:schemeClr val="tx1"/>
+                </a:solidFill>
+              </a:rPr>
+              <a:t>S</a:t>
+            </a:r>
+            <a:r>
+              <a:rPr lang="en-US" dirty="0" smtClean="0">
+                <a:solidFill>
+                  <a:schemeClr val="tx1"/>
+                </a:solidFill>
+              </a:rPr>
+              <a:t>".  Thus </a:t>
+            </a:r>
+            <a:r>
+              <a:rPr lang="en-US" b="1" dirty="0" err="1" smtClean="0">
+                <a:solidFill>
+                  <a:schemeClr val="tx1"/>
+                </a:solidFill>
+              </a:rPr>
+              <a:t>Swidget</a:t>
+            </a:r>
+            <a:r>
+              <a:rPr lang="en-US" b="1" dirty="0" smtClean="0">
+                <a:solidFill>
+                  <a:schemeClr val="tx1"/>
+                </a:solidFill>
+              </a:rPr>
+              <a:t>&lt;%&gt; </a:t>
+            </a:r>
+            <a:r>
+              <a:rPr lang="en-US" dirty="0" smtClean="0">
+                <a:solidFill>
+                  <a:schemeClr val="tx1"/>
+                </a:solidFill>
+              </a:rPr>
+              <a:t>is the interface for </a:t>
+            </a:r>
+            <a:r>
+              <a:rPr lang="en-US" dirty="0" err="1" smtClean="0">
+                <a:solidFill>
+                  <a:schemeClr val="tx1"/>
+                </a:solidFill>
+              </a:rPr>
+              <a:t>stateful</a:t>
+            </a:r>
+            <a:r>
+              <a:rPr lang="en-US" dirty="0" smtClean="0">
+                <a:solidFill>
+                  <a:schemeClr val="tx1"/>
+                </a:solidFill>
+              </a:rPr>
+              <a:t> widgets.</a:t>
+            </a:r>
+            <a:endParaRPr lang="en-US" dirty="0">
               <a:solidFill>
                 <a:schemeClr val="tx1"/>
               </a:solidFill>

</xml_diff>